<commit_message>
Reduce neon glow radius on lines by 50% for tighter effect
Frames unchanged — only line/bar decorations tightened.

Co-Authored-By: Claude Opus 4.5 <noreply@anthropic.com>
</commit_message>
<xml_diff>
--- a/assets/demos/demo-roadmap.pptx
+++ b/assets/demos/demo-roadmap.pptx
@@ -1811,7 +1811,7 @@
             <a:noFill/>
           </a:ln>
           <a:effectLst>
-            <a:glow rad="150000">
+            <a:glow rad="75000">
               <a:srgbClr val="FF6B6B">
                 <a:alpha val="45000"/>
               </a:srgbClr>
@@ -1840,7 +1840,7 @@
             <a:noFill/>
           </a:ln>
           <a:effectLst>
-            <a:glow rad="140000">
+            <a:glow rad="70000">
               <a:srgbClr val="4ECDC4">
                 <a:alpha val="40000"/>
               </a:srgbClr>
@@ -2811,7 +2811,7 @@
             <a:noFill/>
           </a:ln>
           <a:effectLst>
-            <a:glow rad="150000">
+            <a:glow rad="75000">
               <a:srgbClr val="FF6B6B">
                 <a:alpha val="40000"/>
               </a:srgbClr>
@@ -2840,7 +2840,7 @@
             <a:noFill/>
           </a:ln>
           <a:effectLst>
-            <a:glow rad="125000">
+            <a:glow rad="62500">
               <a:srgbClr val="4ECDC4">
                 <a:alpha val="35000"/>
               </a:srgbClr>
@@ -3291,7 +3291,7 @@
             <a:noFill/>
           </a:ln>
           <a:effectLst>
-            <a:glow rad="160000">
+            <a:glow rad="80000">
               <a:srgbClr val="E8A838">
                 <a:alpha val="45000"/>
               </a:srgbClr>
@@ -3320,7 +3320,7 @@
             <a:noFill/>
           </a:ln>
           <a:effectLst>
-            <a:glow rad="125000">
+            <a:glow rad="62500">
               <a:srgbClr val="FF6B6B">
                 <a:alpha val="35000"/>
               </a:srgbClr>

</xml_diff>

<commit_message>
Replace solid line decorations with thin neon frames
LibreOffice renders a:glow on frames more accurately than on
filled rectangles. All line/bar decorations now use add_neon_frame
with thin dimensions for consistent glow rendering in PNG export.

Co-Authored-By: Claude Opus 4.5 <noreply@anthropic.com>
</commit_message>
<xml_diff>
--- a/assets/demos/demo-roadmap.pptx
+++ b/assets/demos/demo-roadmap.pptx
@@ -1438,377 +1438,56 @@
       </p:grpSpPr>
       <p:sp>
         <p:nvSpPr>
-          <p:cNvPr id="2" name="Title 1"/>
-          <p:cNvSpPr>
-            <a:spLocks noGrp="1"/>
-          </p:cNvSpPr>
-          <p:nvPr>
-            <p:ph type="ctrTitle"/>
-          </p:nvPr>
+          <p:cNvPr id="92" name="NF92"/>
+          <p:cNvSpPr/>
+          <p:nvPr/>
         </p:nvSpPr>
         <p:spPr>
           <a:xfrm>
-            <a:off x="685800" y="1597819"/>
-            <a:ext cx="7772400" cy="1102519"/>
+            <a:off x="1371600" y="4507500"/>
+            <a:ext cx="6400800" cy="72000"/>
           </a:xfrm>
+          <a:prstGeom prst="roundRect">
+            <a:avLst>
+              <a:gd name="adj" fmla="val 5000"/>
+            </a:avLst>
+          </a:prstGeom>
+          <a:noFill/>
+          <a:ln w="12700">
+            <a:solidFill>
+              <a:srgbClr val="4ECDC4"/>
+            </a:solidFill>
+          </a:ln>
+          <a:effectLst>
+            <a:glow rad="70000">
+              <a:srgbClr val="4ECDC4">
+                <a:alpha val="40000"/>
+              </a:srgbClr>
+            </a:glow>
+          </a:effectLst>
         </p:spPr>
-        <p:txBody>
-          <a:bodyPr/>
-          <a:lstStyle>
-            <a:lvl1pPr>
-              <a:defRPr sz="4400" b="1">
-                <a:solidFill>
-                  <a:srgbClr val="FF6B6B"/>
-                </a:solidFill>
-              </a:defRPr>
-            </a:lvl1pPr>
-            <a:lvl2pPr>
-              <a:defRPr sz="4400" b="1">
-                <a:solidFill>
-                  <a:srgbClr val="FF6B6B"/>
-                </a:solidFill>
-              </a:defRPr>
-            </a:lvl2pPr>
-            <a:lvl3pPr>
-              <a:defRPr sz="4400" b="1">
-                <a:solidFill>
-                  <a:srgbClr val="FF6B6B"/>
-                </a:solidFill>
-              </a:defRPr>
-            </a:lvl3pPr>
-            <a:lvl4pPr>
-              <a:defRPr sz="4400" b="1">
-                <a:solidFill>
-                  <a:srgbClr val="FF6B6B"/>
-                </a:solidFill>
-              </a:defRPr>
-            </a:lvl4pPr>
-            <a:lvl5pPr>
-              <a:defRPr sz="4400" b="1">
-                <a:solidFill>
-                  <a:srgbClr val="FF6B6B"/>
-                </a:solidFill>
-              </a:defRPr>
-            </a:lvl5pPr>
-          </a:lstStyle>
-          <a:p>
-            <a:pPr algn="ctr"/>
-            <a:r>
-              <a:rPr lang="en-US" sz="4400" b="1">
-                <a:solidFill>
-                  <a:srgbClr val="FF6B6B"/>
-                </a:solidFill>
-              </a:rPr>
-              <a:t>Click to edit Master title style</a:t>
-            </a:r>
-          </a:p>
-        </p:txBody>
-      </p:sp>
-      <p:sp>
-        <p:nvSpPr>
-          <p:cNvPr id="3" name="Subtitle 2"/>
-          <p:cNvSpPr>
-            <a:spLocks noGrp="1"/>
-          </p:cNvSpPr>
-          <p:nvPr>
-            <p:ph type="subTitle" idx="1"/>
-          </p:nvPr>
+      </p:sp>
+      <p:sp>
+        <p:nvSpPr>
+          <p:cNvPr id="91" name="NF91"/>
+          <p:cNvSpPr/>
+          <p:nvPr/>
         </p:nvSpPr>
         <p:spPr>
           <a:xfrm>
-            <a:off x="1371600" y="2914650"/>
-            <a:ext cx="6400800" cy="1314450"/>
+            <a:off x="0" y="-18000"/>
+            <a:ext cx="9144000" cy="72000"/>
           </a:xfrm>
-        </p:spPr>
-        <p:txBody>
-          <a:bodyPr/>
-          <a:lstStyle>
-            <a:lvl1pPr marL="0" indent="0" algn="ctr">
-              <a:buNone/>
-              <a:defRPr sz="2000" b="0">
-                <a:solidFill>
-                  <a:srgbClr val="E8A838"/>
-                </a:solidFill>
-              </a:defRPr>
-            </a:lvl1pPr>
-            <a:lvl2pPr marL="342900" indent="0" algn="ctr">
-              <a:buNone/>
-              <a:defRPr sz="2000" b="0">
-                <a:solidFill>
-                  <a:srgbClr val="E8A838"/>
-                </a:solidFill>
-              </a:defRPr>
-            </a:lvl2pPr>
-            <a:lvl3pPr marL="685800" indent="0" algn="ctr">
-              <a:buNone/>
-              <a:defRPr sz="2000" b="0">
-                <a:solidFill>
-                  <a:srgbClr val="E8A838"/>
-                </a:solidFill>
-              </a:defRPr>
-            </a:lvl3pPr>
-            <a:lvl4pPr marL="1028700" indent="0" algn="ctr">
-              <a:buNone/>
-              <a:defRPr sz="2000" b="0">
-                <a:solidFill>
-                  <a:srgbClr val="E8A838"/>
-                </a:solidFill>
-              </a:defRPr>
-            </a:lvl4pPr>
-            <a:lvl5pPr marL="1371600" indent="0" algn="ctr">
-              <a:buNone/>
-              <a:defRPr sz="2000" b="0">
-                <a:solidFill>
-                  <a:srgbClr val="E8A838"/>
-                </a:solidFill>
-              </a:defRPr>
-            </a:lvl5pPr>
-            <a:lvl6pPr marL="1714500" indent="0" algn="ctr">
-              <a:buNone/>
-              <a:defRPr>
-                <a:solidFill>
-                  <a:schemeClr val="tx1">
-                    <a:tint val="75000"/>
-                  </a:schemeClr>
-                </a:solidFill>
-              </a:defRPr>
-            </a:lvl6pPr>
-            <a:lvl7pPr marL="2057400" indent="0" algn="ctr">
-              <a:buNone/>
-              <a:defRPr>
-                <a:solidFill>
-                  <a:schemeClr val="tx1">
-                    <a:tint val="75000"/>
-                  </a:schemeClr>
-                </a:solidFill>
-              </a:defRPr>
-            </a:lvl7pPr>
-            <a:lvl8pPr marL="2400300" indent="0" algn="ctr">
-              <a:buNone/>
-              <a:defRPr>
-                <a:solidFill>
-                  <a:schemeClr val="tx1">
-                    <a:tint val="75000"/>
-                  </a:schemeClr>
-                </a:solidFill>
-              </a:defRPr>
-            </a:lvl8pPr>
-            <a:lvl9pPr marL="2743200" indent="0" algn="ctr">
-              <a:buNone/>
-              <a:defRPr>
-                <a:solidFill>
-                  <a:schemeClr val="tx1">
-                    <a:tint val="75000"/>
-                  </a:schemeClr>
-                </a:solidFill>
-              </a:defRPr>
-            </a:lvl9pPr>
-          </a:lstStyle>
-          <a:p>
-            <a:pPr algn="ctr"/>
-            <a:r>
-              <a:rPr lang="en-US" sz="2000" b="0">
-                <a:solidFill>
-                  <a:srgbClr val="E8A838"/>
-                </a:solidFill>
-              </a:rPr>
-              <a:t>Click to edit Master subtitle style</a:t>
-            </a:r>
-          </a:p>
-        </p:txBody>
-      </p:sp>
-      <p:sp>
-        <p:nvSpPr>
-          <p:cNvPr id="4" name="Date Placeholder 3"/>
-          <p:cNvSpPr>
-            <a:spLocks noGrp="1"/>
-          </p:cNvSpPr>
-          <p:nvPr>
-            <p:ph type="dt" sz="half" idx="10"/>
-          </p:nvPr>
-        </p:nvSpPr>
-        <p:spPr/>
-        <p:txBody>
-          <a:bodyPr/>
-          <a:lstStyle>
-            <a:lvl1pPr>
-              <a:defRPr sz="900" b="0">
-                <a:solidFill>
-                  <a:srgbClr val="A8B2C1"/>
-                </a:solidFill>
-              </a:defRPr>
-            </a:lvl1pPr>
-            <a:lvl2pPr>
-              <a:defRPr sz="900" b="0">
-                <a:solidFill>
-                  <a:srgbClr val="A8B2C1"/>
-                </a:solidFill>
-              </a:defRPr>
-            </a:lvl2pPr>
-            <a:lvl3pPr>
-              <a:defRPr sz="900" b="0">
-                <a:solidFill>
-                  <a:srgbClr val="A8B2C1"/>
-                </a:solidFill>
-              </a:defRPr>
-            </a:lvl3pPr>
-            <a:lvl4pPr>
-              <a:defRPr sz="900" b="0">
-                <a:solidFill>
-                  <a:srgbClr val="A8B2C1"/>
-                </a:solidFill>
-              </a:defRPr>
-            </a:lvl4pPr>
-            <a:lvl5pPr>
-              <a:defRPr sz="900" b="0">
-                <a:solidFill>
-                  <a:srgbClr val="A8B2C1"/>
-                </a:solidFill>
-              </a:defRPr>
-            </a:lvl5pPr>
-          </a:lstStyle>
-          <a:p>
-            <a:fld id="{241EB5C9-1307-BA42-ABA2-0BC069CD8E7F}" type="datetimeFigureOut">
-              <a:rPr lang="en-US" smtClean="0"/>
-              <a:t>1/2/22</a:t>
-            </a:fld>
-            <a:endParaRPr lang="en-US"/>
-          </a:p>
-        </p:txBody>
-      </p:sp>
-      <p:sp>
-        <p:nvSpPr>
-          <p:cNvPr id="5" name="Footer Placeholder 4"/>
-          <p:cNvSpPr>
-            <a:spLocks noGrp="1"/>
-          </p:cNvSpPr>
-          <p:nvPr>
-            <p:ph type="ftr" sz="quarter" idx="11"/>
-          </p:nvPr>
-        </p:nvSpPr>
-        <p:spPr/>
-        <p:txBody>
-          <a:bodyPr/>
-          <a:lstStyle>
-            <a:lvl1pPr>
-              <a:defRPr sz="900" b="0">
-                <a:solidFill>
-                  <a:srgbClr val="A8B2C1"/>
-                </a:solidFill>
-              </a:defRPr>
-            </a:lvl1pPr>
-            <a:lvl2pPr>
-              <a:defRPr sz="900" b="0">
-                <a:solidFill>
-                  <a:srgbClr val="A8B2C1"/>
-                </a:solidFill>
-              </a:defRPr>
-            </a:lvl2pPr>
-            <a:lvl3pPr>
-              <a:defRPr sz="900" b="0">
-                <a:solidFill>
-                  <a:srgbClr val="A8B2C1"/>
-                </a:solidFill>
-              </a:defRPr>
-            </a:lvl3pPr>
-            <a:lvl4pPr>
-              <a:defRPr sz="900" b="0">
-                <a:solidFill>
-                  <a:srgbClr val="A8B2C1"/>
-                </a:solidFill>
-              </a:defRPr>
-            </a:lvl4pPr>
-            <a:lvl5pPr>
-              <a:defRPr sz="900" b="0">
-                <a:solidFill>
-                  <a:srgbClr val="A8B2C1"/>
-                </a:solidFill>
-              </a:defRPr>
-            </a:lvl5pPr>
-          </a:lstStyle>
-          <a:p>
-            <a:endParaRPr lang="en-US"/>
-          </a:p>
-        </p:txBody>
-      </p:sp>
-      <p:sp>
-        <p:nvSpPr>
-          <p:cNvPr id="6" name="Slide Number Placeholder 5"/>
-          <p:cNvSpPr>
-            <a:spLocks noGrp="1"/>
-          </p:cNvSpPr>
-          <p:nvPr>
-            <p:ph type="sldNum" sz="quarter" idx="12"/>
-          </p:nvPr>
-        </p:nvSpPr>
-        <p:spPr/>
-        <p:txBody>
-          <a:bodyPr/>
-          <a:lstStyle>
-            <a:lvl1pPr>
-              <a:defRPr sz="900" b="0">
-                <a:solidFill>
-                  <a:srgbClr val="A8B2C1"/>
-                </a:solidFill>
-              </a:defRPr>
-            </a:lvl1pPr>
-            <a:lvl2pPr>
-              <a:defRPr sz="900" b="0">
-                <a:solidFill>
-                  <a:srgbClr val="A8B2C1"/>
-                </a:solidFill>
-              </a:defRPr>
-            </a:lvl2pPr>
-            <a:lvl3pPr>
-              <a:defRPr sz="900" b="0">
-                <a:solidFill>
-                  <a:srgbClr val="A8B2C1"/>
-                </a:solidFill>
-              </a:defRPr>
-            </a:lvl3pPr>
-            <a:lvl4pPr>
-              <a:defRPr sz="900" b="0">
-                <a:solidFill>
-                  <a:srgbClr val="A8B2C1"/>
-                </a:solidFill>
-              </a:defRPr>
-            </a:lvl4pPr>
-            <a:lvl5pPr>
-              <a:defRPr sz="900" b="0">
-                <a:solidFill>
-                  <a:srgbClr val="A8B2C1"/>
-                </a:solidFill>
-              </a:defRPr>
-            </a:lvl5pPr>
-          </a:lstStyle>
-          <a:p>
-            <a:fld id="{C5EF2332-01BF-834F-8236-50238282D533}" type="slidenum">
-              <a:rPr lang="en-US" smtClean="0"/>
-              <a:t>‹#›</a:t>
-            </a:fld>
-            <a:endParaRPr lang="en-US"/>
-          </a:p>
-        </p:txBody>
-      </p:sp>
-      <p:sp>
-        <p:nvSpPr>
-          <p:cNvPr id="91" name="R91"/>
-          <p:cNvSpPr/>
-          <p:nvPr/>
-        </p:nvSpPr>
-        <p:spPr>
-          <a:xfrm>
-            <a:off x="0" y="0"/>
-            <a:ext cx="9144000" cy="36000"/>
-          </a:xfrm>
-          <a:prstGeom prst="rect">
-            <a:avLst/>
+          <a:prstGeom prst="roundRect">
+            <a:avLst>
+              <a:gd name="adj" fmla="val 5000"/>
+            </a:avLst>
           </a:prstGeom>
-          <a:solidFill>
-            <a:srgbClr val="FF6B6B"/>
-          </a:solidFill>
-          <a:ln>
-            <a:noFill/>
+          <a:noFill/>
+          <a:ln w="19050">
+            <a:solidFill>
+              <a:srgbClr val="FF6B6B"/>
+            </a:solidFill>
           </a:ln>
           <a:effectLst>
             <a:glow rad="75000">
@@ -1821,32 +1500,357 @@
       </p:sp>
       <p:sp>
         <p:nvSpPr>
-          <p:cNvPr id="92" name="R92"/>
-          <p:cNvSpPr/>
-          <p:nvPr/>
+          <p:cNvPr id="2" name="Title 1"/>
+          <p:cNvSpPr>
+            <a:spLocks noGrp="1"/>
+          </p:cNvSpPr>
+          <p:nvPr>
+            <p:ph type="ctrTitle"/>
+          </p:nvPr>
         </p:nvSpPr>
         <p:spPr>
           <a:xfrm>
-            <a:off x="1371600" y="4543500"/>
-            <a:ext cx="6400800" cy="18000"/>
+            <a:off x="685800" y="1597819"/>
+            <a:ext cx="7772400" cy="1102519"/>
           </a:xfrm>
-          <a:prstGeom prst="rect">
-            <a:avLst/>
-          </a:prstGeom>
-          <a:solidFill>
-            <a:srgbClr val="4ECDC4"/>
-          </a:solidFill>
-          <a:ln>
-            <a:noFill/>
-          </a:ln>
-          <a:effectLst>
-            <a:glow rad="70000">
-              <a:srgbClr val="4ECDC4">
-                <a:alpha val="40000"/>
-              </a:srgbClr>
-            </a:glow>
-          </a:effectLst>
         </p:spPr>
+        <p:txBody>
+          <a:bodyPr/>
+          <a:lstStyle>
+            <a:lvl1pPr>
+              <a:defRPr sz="4400" b="1">
+                <a:solidFill>
+                  <a:srgbClr val="FF6B6B"/>
+                </a:solidFill>
+              </a:defRPr>
+            </a:lvl1pPr>
+            <a:lvl2pPr>
+              <a:defRPr sz="4400" b="1">
+                <a:solidFill>
+                  <a:srgbClr val="FF6B6B"/>
+                </a:solidFill>
+              </a:defRPr>
+            </a:lvl2pPr>
+            <a:lvl3pPr>
+              <a:defRPr sz="4400" b="1">
+                <a:solidFill>
+                  <a:srgbClr val="FF6B6B"/>
+                </a:solidFill>
+              </a:defRPr>
+            </a:lvl3pPr>
+            <a:lvl4pPr>
+              <a:defRPr sz="4400" b="1">
+                <a:solidFill>
+                  <a:srgbClr val="FF6B6B"/>
+                </a:solidFill>
+              </a:defRPr>
+            </a:lvl4pPr>
+            <a:lvl5pPr>
+              <a:defRPr sz="4400" b="1">
+                <a:solidFill>
+                  <a:srgbClr val="FF6B6B"/>
+                </a:solidFill>
+              </a:defRPr>
+            </a:lvl5pPr>
+          </a:lstStyle>
+          <a:p>
+            <a:pPr algn="ctr"/>
+            <a:r>
+              <a:rPr lang="en-US" sz="4400" b="1">
+                <a:solidFill>
+                  <a:srgbClr val="FF6B6B"/>
+                </a:solidFill>
+              </a:rPr>
+              <a:t>Click to edit Master title style</a:t>
+            </a:r>
+          </a:p>
+        </p:txBody>
+      </p:sp>
+      <p:sp>
+        <p:nvSpPr>
+          <p:cNvPr id="3" name="Subtitle 2"/>
+          <p:cNvSpPr>
+            <a:spLocks noGrp="1"/>
+          </p:cNvSpPr>
+          <p:nvPr>
+            <p:ph type="subTitle" idx="1"/>
+          </p:nvPr>
+        </p:nvSpPr>
+        <p:spPr>
+          <a:xfrm>
+            <a:off x="1371600" y="2914650"/>
+            <a:ext cx="6400800" cy="1314450"/>
+          </a:xfrm>
+        </p:spPr>
+        <p:txBody>
+          <a:bodyPr/>
+          <a:lstStyle>
+            <a:lvl1pPr marL="0" indent="0" algn="ctr">
+              <a:buNone/>
+              <a:defRPr sz="2000" b="0">
+                <a:solidFill>
+                  <a:srgbClr val="E8A838"/>
+                </a:solidFill>
+              </a:defRPr>
+            </a:lvl1pPr>
+            <a:lvl2pPr marL="342900" indent="0" algn="ctr">
+              <a:buNone/>
+              <a:defRPr sz="2000" b="0">
+                <a:solidFill>
+                  <a:srgbClr val="E8A838"/>
+                </a:solidFill>
+              </a:defRPr>
+            </a:lvl2pPr>
+            <a:lvl3pPr marL="685800" indent="0" algn="ctr">
+              <a:buNone/>
+              <a:defRPr sz="2000" b="0">
+                <a:solidFill>
+                  <a:srgbClr val="E8A838"/>
+                </a:solidFill>
+              </a:defRPr>
+            </a:lvl3pPr>
+            <a:lvl4pPr marL="1028700" indent="0" algn="ctr">
+              <a:buNone/>
+              <a:defRPr sz="2000" b="0">
+                <a:solidFill>
+                  <a:srgbClr val="E8A838"/>
+                </a:solidFill>
+              </a:defRPr>
+            </a:lvl4pPr>
+            <a:lvl5pPr marL="1371600" indent="0" algn="ctr">
+              <a:buNone/>
+              <a:defRPr sz="2000" b="0">
+                <a:solidFill>
+                  <a:srgbClr val="E8A838"/>
+                </a:solidFill>
+              </a:defRPr>
+            </a:lvl5pPr>
+            <a:lvl6pPr marL="1714500" indent="0" algn="ctr">
+              <a:buNone/>
+              <a:defRPr>
+                <a:solidFill>
+                  <a:schemeClr val="tx1">
+                    <a:tint val="75000"/>
+                  </a:schemeClr>
+                </a:solidFill>
+              </a:defRPr>
+            </a:lvl6pPr>
+            <a:lvl7pPr marL="2057400" indent="0" algn="ctr">
+              <a:buNone/>
+              <a:defRPr>
+                <a:solidFill>
+                  <a:schemeClr val="tx1">
+                    <a:tint val="75000"/>
+                  </a:schemeClr>
+                </a:solidFill>
+              </a:defRPr>
+            </a:lvl7pPr>
+            <a:lvl8pPr marL="2400300" indent="0" algn="ctr">
+              <a:buNone/>
+              <a:defRPr>
+                <a:solidFill>
+                  <a:schemeClr val="tx1">
+                    <a:tint val="75000"/>
+                  </a:schemeClr>
+                </a:solidFill>
+              </a:defRPr>
+            </a:lvl8pPr>
+            <a:lvl9pPr marL="2743200" indent="0" algn="ctr">
+              <a:buNone/>
+              <a:defRPr>
+                <a:solidFill>
+                  <a:schemeClr val="tx1">
+                    <a:tint val="75000"/>
+                  </a:schemeClr>
+                </a:solidFill>
+              </a:defRPr>
+            </a:lvl9pPr>
+          </a:lstStyle>
+          <a:p>
+            <a:pPr algn="ctr"/>
+            <a:r>
+              <a:rPr lang="en-US" sz="2000" b="0">
+                <a:solidFill>
+                  <a:srgbClr val="E8A838"/>
+                </a:solidFill>
+              </a:rPr>
+              <a:t>Click to edit Master subtitle style</a:t>
+            </a:r>
+          </a:p>
+        </p:txBody>
+      </p:sp>
+      <p:sp>
+        <p:nvSpPr>
+          <p:cNvPr id="4" name="Date Placeholder 3"/>
+          <p:cNvSpPr>
+            <a:spLocks noGrp="1"/>
+          </p:cNvSpPr>
+          <p:nvPr>
+            <p:ph type="dt" sz="half" idx="10"/>
+          </p:nvPr>
+        </p:nvSpPr>
+        <p:spPr/>
+        <p:txBody>
+          <a:bodyPr/>
+          <a:lstStyle>
+            <a:lvl1pPr>
+              <a:defRPr sz="900" b="0">
+                <a:solidFill>
+                  <a:srgbClr val="A8B2C1"/>
+                </a:solidFill>
+              </a:defRPr>
+            </a:lvl1pPr>
+            <a:lvl2pPr>
+              <a:defRPr sz="900" b="0">
+                <a:solidFill>
+                  <a:srgbClr val="A8B2C1"/>
+                </a:solidFill>
+              </a:defRPr>
+            </a:lvl2pPr>
+            <a:lvl3pPr>
+              <a:defRPr sz="900" b="0">
+                <a:solidFill>
+                  <a:srgbClr val="A8B2C1"/>
+                </a:solidFill>
+              </a:defRPr>
+            </a:lvl3pPr>
+            <a:lvl4pPr>
+              <a:defRPr sz="900" b="0">
+                <a:solidFill>
+                  <a:srgbClr val="A8B2C1"/>
+                </a:solidFill>
+              </a:defRPr>
+            </a:lvl4pPr>
+            <a:lvl5pPr>
+              <a:defRPr sz="900" b="0">
+                <a:solidFill>
+                  <a:srgbClr val="A8B2C1"/>
+                </a:solidFill>
+              </a:defRPr>
+            </a:lvl5pPr>
+          </a:lstStyle>
+          <a:p>
+            <a:fld id="{241EB5C9-1307-BA42-ABA2-0BC069CD8E7F}" type="datetimeFigureOut">
+              <a:rPr lang="en-US" smtClean="0"/>
+              <a:t>1/2/22</a:t>
+            </a:fld>
+            <a:endParaRPr lang="en-US"/>
+          </a:p>
+        </p:txBody>
+      </p:sp>
+      <p:sp>
+        <p:nvSpPr>
+          <p:cNvPr id="5" name="Footer Placeholder 4"/>
+          <p:cNvSpPr>
+            <a:spLocks noGrp="1"/>
+          </p:cNvSpPr>
+          <p:nvPr>
+            <p:ph type="ftr" sz="quarter" idx="11"/>
+          </p:nvPr>
+        </p:nvSpPr>
+        <p:spPr/>
+        <p:txBody>
+          <a:bodyPr/>
+          <a:lstStyle>
+            <a:lvl1pPr>
+              <a:defRPr sz="900" b="0">
+                <a:solidFill>
+                  <a:srgbClr val="A8B2C1"/>
+                </a:solidFill>
+              </a:defRPr>
+            </a:lvl1pPr>
+            <a:lvl2pPr>
+              <a:defRPr sz="900" b="0">
+                <a:solidFill>
+                  <a:srgbClr val="A8B2C1"/>
+                </a:solidFill>
+              </a:defRPr>
+            </a:lvl2pPr>
+            <a:lvl3pPr>
+              <a:defRPr sz="900" b="0">
+                <a:solidFill>
+                  <a:srgbClr val="A8B2C1"/>
+                </a:solidFill>
+              </a:defRPr>
+            </a:lvl3pPr>
+            <a:lvl4pPr>
+              <a:defRPr sz="900" b="0">
+                <a:solidFill>
+                  <a:srgbClr val="A8B2C1"/>
+                </a:solidFill>
+              </a:defRPr>
+            </a:lvl4pPr>
+            <a:lvl5pPr>
+              <a:defRPr sz="900" b="0">
+                <a:solidFill>
+                  <a:srgbClr val="A8B2C1"/>
+                </a:solidFill>
+              </a:defRPr>
+            </a:lvl5pPr>
+          </a:lstStyle>
+          <a:p>
+            <a:endParaRPr lang="en-US"/>
+          </a:p>
+        </p:txBody>
+      </p:sp>
+      <p:sp>
+        <p:nvSpPr>
+          <p:cNvPr id="6" name="Slide Number Placeholder 5"/>
+          <p:cNvSpPr>
+            <a:spLocks noGrp="1"/>
+          </p:cNvSpPr>
+          <p:nvPr>
+            <p:ph type="sldNum" sz="quarter" idx="12"/>
+          </p:nvPr>
+        </p:nvSpPr>
+        <p:spPr/>
+        <p:txBody>
+          <a:bodyPr/>
+          <a:lstStyle>
+            <a:lvl1pPr>
+              <a:defRPr sz="900" b="0">
+                <a:solidFill>
+                  <a:srgbClr val="A8B2C1"/>
+                </a:solidFill>
+              </a:defRPr>
+            </a:lvl1pPr>
+            <a:lvl2pPr>
+              <a:defRPr sz="900" b="0">
+                <a:solidFill>
+                  <a:srgbClr val="A8B2C1"/>
+                </a:solidFill>
+              </a:defRPr>
+            </a:lvl2pPr>
+            <a:lvl3pPr>
+              <a:defRPr sz="900" b="0">
+                <a:solidFill>
+                  <a:srgbClr val="A8B2C1"/>
+                </a:solidFill>
+              </a:defRPr>
+            </a:lvl3pPr>
+            <a:lvl4pPr>
+              <a:defRPr sz="900" b="0">
+                <a:solidFill>
+                  <a:srgbClr val="A8B2C1"/>
+                </a:solidFill>
+              </a:defRPr>
+            </a:lvl4pPr>
+            <a:lvl5pPr>
+              <a:defRPr sz="900" b="0">
+                <a:solidFill>
+                  <a:srgbClr val="A8B2C1"/>
+                </a:solidFill>
+              </a:defRPr>
+            </a:lvl5pPr>
+          </a:lstStyle>
+          <a:p>
+            <a:fld id="{C5EF2332-01BF-834F-8236-50238282D533}" type="slidenum">
+              <a:rPr lang="en-US" smtClean="0"/>
+              <a:t>‹#›</a:t>
+            </a:fld>
+            <a:endParaRPr lang="en-US"/>
+          </a:p>
+        </p:txBody>
       </p:sp>
     </p:spTree>
     <p:extLst>
@@ -2450,365 +2454,56 @@
       </p:grpSpPr>
       <p:sp>
         <p:nvSpPr>
-          <p:cNvPr id="2" name="Title 1"/>
-          <p:cNvSpPr>
-            <a:spLocks noGrp="1"/>
-          </p:cNvSpPr>
-          <p:nvPr>
-            <p:ph type="title"/>
-          </p:nvPr>
-        </p:nvSpPr>
-        <p:spPr/>
-        <p:txBody>
-          <a:bodyPr/>
-          <a:lstStyle>
-            <a:lvl1pPr>
-              <a:defRPr sz="3000" b="1">
-                <a:solidFill>
-                  <a:srgbClr val="FF6B6B"/>
-                </a:solidFill>
-              </a:defRPr>
-            </a:lvl1pPr>
-            <a:lvl2pPr>
-              <a:defRPr sz="3000" b="1">
-                <a:solidFill>
-                  <a:srgbClr val="FF6B6B"/>
-                </a:solidFill>
-              </a:defRPr>
-            </a:lvl2pPr>
-            <a:lvl3pPr>
-              <a:defRPr sz="3000" b="1">
-                <a:solidFill>
-                  <a:srgbClr val="FF6B6B"/>
-                </a:solidFill>
-              </a:defRPr>
-            </a:lvl3pPr>
-            <a:lvl4pPr>
-              <a:defRPr sz="3000" b="1">
-                <a:solidFill>
-                  <a:srgbClr val="FF6B6B"/>
-                </a:solidFill>
-              </a:defRPr>
-            </a:lvl4pPr>
-            <a:lvl5pPr>
-              <a:defRPr sz="3000" b="1">
-                <a:solidFill>
-                  <a:srgbClr val="FF6B6B"/>
-                </a:solidFill>
-              </a:defRPr>
-            </a:lvl5pPr>
-          </a:lstStyle>
-          <a:p>
-            <a:r>
-              <a:rPr lang="en-US" sz="3000" b="1">
-                <a:solidFill>
-                  <a:srgbClr val="FF6B6B"/>
-                </a:solidFill>
-              </a:rPr>
-              <a:t>Click to edit Master title style</a:t>
-            </a:r>
-          </a:p>
-        </p:txBody>
-      </p:sp>
-      <p:sp>
-        <p:nvSpPr>
-          <p:cNvPr id="3" name="Content Placeholder 2"/>
-          <p:cNvSpPr>
-            <a:spLocks noGrp="1"/>
-          </p:cNvSpPr>
-          <p:nvPr>
-            <p:ph idx="1"/>
-          </p:nvPr>
-        </p:nvSpPr>
-        <p:spPr/>
-        <p:txBody>
-          <a:bodyPr/>
-          <a:lstStyle>
-            <a:lvl1pPr>
-              <a:defRPr sz="1800" b="0">
-                <a:solidFill>
-                  <a:srgbClr val="F0F0F0"/>
-                </a:solidFill>
-              </a:defRPr>
-            </a:lvl1pPr>
-            <a:lvl2pPr>
-              <a:defRPr sz="1800" b="0">
-                <a:solidFill>
-                  <a:srgbClr val="F0F0F0"/>
-                </a:solidFill>
-              </a:defRPr>
-            </a:lvl2pPr>
-            <a:lvl3pPr>
-              <a:defRPr sz="1800" b="0">
-                <a:solidFill>
-                  <a:srgbClr val="F0F0F0"/>
-                </a:solidFill>
-              </a:defRPr>
-            </a:lvl3pPr>
-            <a:lvl4pPr>
-              <a:defRPr sz="1800" b="0">
-                <a:solidFill>
-                  <a:srgbClr val="F0F0F0"/>
-                </a:solidFill>
-              </a:defRPr>
-            </a:lvl4pPr>
-            <a:lvl5pPr>
-              <a:defRPr sz="1800" b="0">
-                <a:solidFill>
-                  <a:srgbClr val="F0F0F0"/>
-                </a:solidFill>
-              </a:defRPr>
-            </a:lvl5pPr>
-          </a:lstStyle>
-          <a:p>
-            <a:pPr lvl="0"/>
-            <a:r>
-              <a:rPr lang="en-US" sz="1800" b="0">
-                <a:solidFill>
-                  <a:srgbClr val="F0F0F0"/>
-                </a:solidFill>
-              </a:rPr>
-              <a:t>Click to edit Master text styles</a:t>
-            </a:r>
-          </a:p>
-          <a:p>
-            <a:pPr lvl="1"/>
-            <a:r>
-              <a:rPr lang="en-US" sz="1800" b="0">
-                <a:solidFill>
-                  <a:srgbClr val="F0F0F0"/>
-                </a:solidFill>
-              </a:rPr>
-              <a:t>Second level</a:t>
-            </a:r>
-          </a:p>
-          <a:p>
-            <a:pPr lvl="2"/>
-            <a:r>
-              <a:rPr lang="en-US" sz="1800" b="0">
-                <a:solidFill>
-                  <a:srgbClr val="F0F0F0"/>
-                </a:solidFill>
-              </a:rPr>
-              <a:t>Third level</a:t>
-            </a:r>
-          </a:p>
-          <a:p>
-            <a:pPr lvl="3"/>
-            <a:r>
-              <a:rPr lang="en-US" sz="1800" b="0">
-                <a:solidFill>
-                  <a:srgbClr val="F0F0F0"/>
-                </a:solidFill>
-              </a:rPr>
-              <a:t>Fourth level</a:t>
-            </a:r>
-          </a:p>
-          <a:p>
-            <a:pPr lvl="4"/>
-            <a:r>
-              <a:rPr lang="en-US" sz="1800" b="0">
-                <a:solidFill>
-                  <a:srgbClr val="F0F0F0"/>
-                </a:solidFill>
-              </a:rPr>
-              <a:t>Fifth level</a:t>
-            </a:r>
-          </a:p>
-        </p:txBody>
-      </p:sp>
-      <p:sp>
-        <p:nvSpPr>
-          <p:cNvPr id="4" name="Date Placeholder 3"/>
-          <p:cNvSpPr>
-            <a:spLocks noGrp="1"/>
-          </p:cNvSpPr>
-          <p:nvPr>
-            <p:ph type="dt" sz="half" idx="10"/>
-          </p:nvPr>
-        </p:nvSpPr>
-        <p:spPr/>
-        <p:txBody>
-          <a:bodyPr/>
-          <a:lstStyle>
-            <a:lvl1pPr>
-              <a:defRPr sz="900" b="0">
-                <a:solidFill>
-                  <a:srgbClr val="A8B2C1"/>
-                </a:solidFill>
-              </a:defRPr>
-            </a:lvl1pPr>
-            <a:lvl2pPr>
-              <a:defRPr sz="900" b="0">
-                <a:solidFill>
-                  <a:srgbClr val="A8B2C1"/>
-                </a:solidFill>
-              </a:defRPr>
-            </a:lvl2pPr>
-            <a:lvl3pPr>
-              <a:defRPr sz="900" b="0">
-                <a:solidFill>
-                  <a:srgbClr val="A8B2C1"/>
-                </a:solidFill>
-              </a:defRPr>
-            </a:lvl3pPr>
-            <a:lvl4pPr>
-              <a:defRPr sz="900" b="0">
-                <a:solidFill>
-                  <a:srgbClr val="A8B2C1"/>
-                </a:solidFill>
-              </a:defRPr>
-            </a:lvl4pPr>
-            <a:lvl5pPr>
-              <a:defRPr sz="900" b="0">
-                <a:solidFill>
-                  <a:srgbClr val="A8B2C1"/>
-                </a:solidFill>
-              </a:defRPr>
-            </a:lvl5pPr>
-          </a:lstStyle>
-          <a:p>
-            <a:fld id="{241EB5C9-1307-BA42-ABA2-0BC069CD8E7F}" type="datetimeFigureOut">
-              <a:rPr lang="en-US" smtClean="0"/>
-              <a:t>1/2/22</a:t>
-            </a:fld>
-            <a:endParaRPr lang="en-US"/>
-          </a:p>
-        </p:txBody>
-      </p:sp>
-      <p:sp>
-        <p:nvSpPr>
-          <p:cNvPr id="5" name="Footer Placeholder 4"/>
-          <p:cNvSpPr>
-            <a:spLocks noGrp="1"/>
-          </p:cNvSpPr>
-          <p:nvPr>
-            <p:ph type="ftr" sz="quarter" idx="11"/>
-          </p:nvPr>
-        </p:nvSpPr>
-        <p:spPr/>
-        <p:txBody>
-          <a:bodyPr/>
-          <a:lstStyle>
-            <a:lvl1pPr>
-              <a:defRPr sz="900" b="0">
-                <a:solidFill>
-                  <a:srgbClr val="A8B2C1"/>
-                </a:solidFill>
-              </a:defRPr>
-            </a:lvl1pPr>
-            <a:lvl2pPr>
-              <a:defRPr sz="900" b="0">
-                <a:solidFill>
-                  <a:srgbClr val="A8B2C1"/>
-                </a:solidFill>
-              </a:defRPr>
-            </a:lvl2pPr>
-            <a:lvl3pPr>
-              <a:defRPr sz="900" b="0">
-                <a:solidFill>
-                  <a:srgbClr val="A8B2C1"/>
-                </a:solidFill>
-              </a:defRPr>
-            </a:lvl3pPr>
-            <a:lvl4pPr>
-              <a:defRPr sz="900" b="0">
-                <a:solidFill>
-                  <a:srgbClr val="A8B2C1"/>
-                </a:solidFill>
-              </a:defRPr>
-            </a:lvl4pPr>
-            <a:lvl5pPr>
-              <a:defRPr sz="900" b="0">
-                <a:solidFill>
-                  <a:srgbClr val="A8B2C1"/>
-                </a:solidFill>
-              </a:defRPr>
-            </a:lvl5pPr>
-          </a:lstStyle>
-          <a:p>
-            <a:endParaRPr lang="en-US"/>
-          </a:p>
-        </p:txBody>
-      </p:sp>
-      <p:sp>
-        <p:nvSpPr>
-          <p:cNvPr id="6" name="Slide Number Placeholder 5"/>
-          <p:cNvSpPr>
-            <a:spLocks noGrp="1"/>
-          </p:cNvSpPr>
-          <p:nvPr>
-            <p:ph type="sldNum" sz="quarter" idx="12"/>
-          </p:nvPr>
-        </p:nvSpPr>
-        <p:spPr/>
-        <p:txBody>
-          <a:bodyPr/>
-          <a:lstStyle>
-            <a:lvl1pPr>
-              <a:defRPr sz="900" b="0">
-                <a:solidFill>
-                  <a:srgbClr val="A8B2C1"/>
-                </a:solidFill>
-              </a:defRPr>
-            </a:lvl1pPr>
-            <a:lvl2pPr>
-              <a:defRPr sz="900" b="0">
-                <a:solidFill>
-                  <a:srgbClr val="A8B2C1"/>
-                </a:solidFill>
-              </a:defRPr>
-            </a:lvl2pPr>
-            <a:lvl3pPr>
-              <a:defRPr sz="900" b="0">
-                <a:solidFill>
-                  <a:srgbClr val="A8B2C1"/>
-                </a:solidFill>
-              </a:defRPr>
-            </a:lvl3pPr>
-            <a:lvl4pPr>
-              <a:defRPr sz="900" b="0">
-                <a:solidFill>
-                  <a:srgbClr val="A8B2C1"/>
-                </a:solidFill>
-              </a:defRPr>
-            </a:lvl4pPr>
-            <a:lvl5pPr>
-              <a:defRPr sz="900" b="0">
-                <a:solidFill>
-                  <a:srgbClr val="A8B2C1"/>
-                </a:solidFill>
-              </a:defRPr>
-            </a:lvl5pPr>
-          </a:lstStyle>
-          <a:p>
-            <a:fld id="{C5EF2332-01BF-834F-8236-50238282D533}" type="slidenum">
-              <a:rPr lang="en-US" smtClean="0"/>
-              <a:t>‹#›</a:t>
-            </a:fld>
-            <a:endParaRPr lang="en-US"/>
-          </a:p>
-        </p:txBody>
-      </p:sp>
-      <p:sp>
-        <p:nvSpPr>
-          <p:cNvPr id="93" name="R93"/>
+          <p:cNvPr id="94" name="NF94"/>
           <p:cNvSpPr/>
           <p:nvPr/>
         </p:nvSpPr>
         <p:spPr>
           <a:xfrm>
-            <a:off x="0" y="0"/>
-            <a:ext cx="60000" cy="5143500"/>
+            <a:off x="457200" y="1038000"/>
+            <a:ext cx="8229600" cy="48000"/>
           </a:xfrm>
-          <a:prstGeom prst="rect">
-            <a:avLst/>
+          <a:prstGeom prst="roundRect">
+            <a:avLst>
+              <a:gd name="adj" fmla="val 5000"/>
+            </a:avLst>
           </a:prstGeom>
-          <a:solidFill>
-            <a:srgbClr val="FF6B6B"/>
-          </a:solidFill>
-          <a:ln>
-            <a:noFill/>
+          <a:noFill/>
+          <a:ln w="12700">
+            <a:solidFill>
+              <a:srgbClr val="4ECDC4"/>
+            </a:solidFill>
+          </a:ln>
+          <a:effectLst>
+            <a:glow rad="62500">
+              <a:srgbClr val="4ECDC4">
+                <a:alpha val="35000"/>
+              </a:srgbClr>
+            </a:glow>
+          </a:effectLst>
+        </p:spPr>
+      </p:sp>
+      <p:sp>
+        <p:nvSpPr>
+          <p:cNvPr id="93" name="NF93"/>
+          <p:cNvSpPr/>
+          <p:nvPr/>
+        </p:nvSpPr>
+        <p:spPr>
+          <a:xfrm>
+            <a:off x="-30000" y="0"/>
+            <a:ext cx="120000" cy="5143500"/>
+          </a:xfrm>
+          <a:prstGeom prst="roundRect">
+            <a:avLst>
+              <a:gd name="adj" fmla="val 5000"/>
+            </a:avLst>
+          </a:prstGeom>
+          <a:noFill/>
+          <a:ln w="19050">
+            <a:solidFill>
+              <a:srgbClr val="FF6B6B"/>
+            </a:solidFill>
           </a:ln>
           <a:effectLst>
             <a:glow rad="75000">
@@ -2821,32 +2516,345 @@
       </p:sp>
       <p:sp>
         <p:nvSpPr>
-          <p:cNvPr id="94" name="R94"/>
-          <p:cNvSpPr/>
-          <p:nvPr/>
-        </p:nvSpPr>
-        <p:spPr>
-          <a:xfrm>
-            <a:off x="457200" y="1050000"/>
-            <a:ext cx="8229600" cy="24000"/>
-          </a:xfrm>
-          <a:prstGeom prst="rect">
-            <a:avLst/>
-          </a:prstGeom>
-          <a:solidFill>
-            <a:srgbClr val="4ECDC4"/>
-          </a:solidFill>
-          <a:ln>
-            <a:noFill/>
-          </a:ln>
-          <a:effectLst>
-            <a:glow rad="62500">
-              <a:srgbClr val="4ECDC4">
-                <a:alpha val="35000"/>
-              </a:srgbClr>
-            </a:glow>
-          </a:effectLst>
-        </p:spPr>
+          <p:cNvPr id="2" name="Title 1"/>
+          <p:cNvSpPr>
+            <a:spLocks noGrp="1"/>
+          </p:cNvSpPr>
+          <p:nvPr>
+            <p:ph type="title"/>
+          </p:nvPr>
+        </p:nvSpPr>
+        <p:spPr/>
+        <p:txBody>
+          <a:bodyPr/>
+          <a:lstStyle>
+            <a:lvl1pPr>
+              <a:defRPr sz="3000" b="1">
+                <a:solidFill>
+                  <a:srgbClr val="FF6B6B"/>
+                </a:solidFill>
+              </a:defRPr>
+            </a:lvl1pPr>
+            <a:lvl2pPr>
+              <a:defRPr sz="3000" b="1">
+                <a:solidFill>
+                  <a:srgbClr val="FF6B6B"/>
+                </a:solidFill>
+              </a:defRPr>
+            </a:lvl2pPr>
+            <a:lvl3pPr>
+              <a:defRPr sz="3000" b="1">
+                <a:solidFill>
+                  <a:srgbClr val="FF6B6B"/>
+                </a:solidFill>
+              </a:defRPr>
+            </a:lvl3pPr>
+            <a:lvl4pPr>
+              <a:defRPr sz="3000" b="1">
+                <a:solidFill>
+                  <a:srgbClr val="FF6B6B"/>
+                </a:solidFill>
+              </a:defRPr>
+            </a:lvl4pPr>
+            <a:lvl5pPr>
+              <a:defRPr sz="3000" b="1">
+                <a:solidFill>
+                  <a:srgbClr val="FF6B6B"/>
+                </a:solidFill>
+              </a:defRPr>
+            </a:lvl5pPr>
+          </a:lstStyle>
+          <a:p>
+            <a:r>
+              <a:rPr lang="en-US" sz="3000" b="1">
+                <a:solidFill>
+                  <a:srgbClr val="FF6B6B"/>
+                </a:solidFill>
+              </a:rPr>
+              <a:t>Click to edit Master title style</a:t>
+            </a:r>
+          </a:p>
+        </p:txBody>
+      </p:sp>
+      <p:sp>
+        <p:nvSpPr>
+          <p:cNvPr id="3" name="Content Placeholder 2"/>
+          <p:cNvSpPr>
+            <a:spLocks noGrp="1"/>
+          </p:cNvSpPr>
+          <p:nvPr>
+            <p:ph idx="1"/>
+          </p:nvPr>
+        </p:nvSpPr>
+        <p:spPr/>
+        <p:txBody>
+          <a:bodyPr/>
+          <a:lstStyle>
+            <a:lvl1pPr>
+              <a:defRPr sz="1800" b="0">
+                <a:solidFill>
+                  <a:srgbClr val="F0F0F0"/>
+                </a:solidFill>
+              </a:defRPr>
+            </a:lvl1pPr>
+            <a:lvl2pPr>
+              <a:defRPr sz="1800" b="0">
+                <a:solidFill>
+                  <a:srgbClr val="F0F0F0"/>
+                </a:solidFill>
+              </a:defRPr>
+            </a:lvl2pPr>
+            <a:lvl3pPr>
+              <a:defRPr sz="1800" b="0">
+                <a:solidFill>
+                  <a:srgbClr val="F0F0F0"/>
+                </a:solidFill>
+              </a:defRPr>
+            </a:lvl3pPr>
+            <a:lvl4pPr>
+              <a:defRPr sz="1800" b="0">
+                <a:solidFill>
+                  <a:srgbClr val="F0F0F0"/>
+                </a:solidFill>
+              </a:defRPr>
+            </a:lvl4pPr>
+            <a:lvl5pPr>
+              <a:defRPr sz="1800" b="0">
+                <a:solidFill>
+                  <a:srgbClr val="F0F0F0"/>
+                </a:solidFill>
+              </a:defRPr>
+            </a:lvl5pPr>
+          </a:lstStyle>
+          <a:p>
+            <a:pPr lvl="0"/>
+            <a:r>
+              <a:rPr lang="en-US" sz="1800" b="0">
+                <a:solidFill>
+                  <a:srgbClr val="F0F0F0"/>
+                </a:solidFill>
+              </a:rPr>
+              <a:t>Click to edit Master text styles</a:t>
+            </a:r>
+          </a:p>
+          <a:p>
+            <a:pPr lvl="1"/>
+            <a:r>
+              <a:rPr lang="en-US" sz="1800" b="0">
+                <a:solidFill>
+                  <a:srgbClr val="F0F0F0"/>
+                </a:solidFill>
+              </a:rPr>
+              <a:t>Second level</a:t>
+            </a:r>
+          </a:p>
+          <a:p>
+            <a:pPr lvl="2"/>
+            <a:r>
+              <a:rPr lang="en-US" sz="1800" b="0">
+                <a:solidFill>
+                  <a:srgbClr val="F0F0F0"/>
+                </a:solidFill>
+              </a:rPr>
+              <a:t>Third level</a:t>
+            </a:r>
+          </a:p>
+          <a:p>
+            <a:pPr lvl="3"/>
+            <a:r>
+              <a:rPr lang="en-US" sz="1800" b="0">
+                <a:solidFill>
+                  <a:srgbClr val="F0F0F0"/>
+                </a:solidFill>
+              </a:rPr>
+              <a:t>Fourth level</a:t>
+            </a:r>
+          </a:p>
+          <a:p>
+            <a:pPr lvl="4"/>
+            <a:r>
+              <a:rPr lang="en-US" sz="1800" b="0">
+                <a:solidFill>
+                  <a:srgbClr val="F0F0F0"/>
+                </a:solidFill>
+              </a:rPr>
+              <a:t>Fifth level</a:t>
+            </a:r>
+          </a:p>
+        </p:txBody>
+      </p:sp>
+      <p:sp>
+        <p:nvSpPr>
+          <p:cNvPr id="4" name="Date Placeholder 3"/>
+          <p:cNvSpPr>
+            <a:spLocks noGrp="1"/>
+          </p:cNvSpPr>
+          <p:nvPr>
+            <p:ph type="dt" sz="half" idx="10"/>
+          </p:nvPr>
+        </p:nvSpPr>
+        <p:spPr/>
+        <p:txBody>
+          <a:bodyPr/>
+          <a:lstStyle>
+            <a:lvl1pPr>
+              <a:defRPr sz="900" b="0">
+                <a:solidFill>
+                  <a:srgbClr val="A8B2C1"/>
+                </a:solidFill>
+              </a:defRPr>
+            </a:lvl1pPr>
+            <a:lvl2pPr>
+              <a:defRPr sz="900" b="0">
+                <a:solidFill>
+                  <a:srgbClr val="A8B2C1"/>
+                </a:solidFill>
+              </a:defRPr>
+            </a:lvl2pPr>
+            <a:lvl3pPr>
+              <a:defRPr sz="900" b="0">
+                <a:solidFill>
+                  <a:srgbClr val="A8B2C1"/>
+                </a:solidFill>
+              </a:defRPr>
+            </a:lvl3pPr>
+            <a:lvl4pPr>
+              <a:defRPr sz="900" b="0">
+                <a:solidFill>
+                  <a:srgbClr val="A8B2C1"/>
+                </a:solidFill>
+              </a:defRPr>
+            </a:lvl4pPr>
+            <a:lvl5pPr>
+              <a:defRPr sz="900" b="0">
+                <a:solidFill>
+                  <a:srgbClr val="A8B2C1"/>
+                </a:solidFill>
+              </a:defRPr>
+            </a:lvl5pPr>
+          </a:lstStyle>
+          <a:p>
+            <a:fld id="{241EB5C9-1307-BA42-ABA2-0BC069CD8E7F}" type="datetimeFigureOut">
+              <a:rPr lang="en-US" smtClean="0"/>
+              <a:t>1/2/22</a:t>
+            </a:fld>
+            <a:endParaRPr lang="en-US"/>
+          </a:p>
+        </p:txBody>
+      </p:sp>
+      <p:sp>
+        <p:nvSpPr>
+          <p:cNvPr id="5" name="Footer Placeholder 4"/>
+          <p:cNvSpPr>
+            <a:spLocks noGrp="1"/>
+          </p:cNvSpPr>
+          <p:nvPr>
+            <p:ph type="ftr" sz="quarter" idx="11"/>
+          </p:nvPr>
+        </p:nvSpPr>
+        <p:spPr/>
+        <p:txBody>
+          <a:bodyPr/>
+          <a:lstStyle>
+            <a:lvl1pPr>
+              <a:defRPr sz="900" b="0">
+                <a:solidFill>
+                  <a:srgbClr val="A8B2C1"/>
+                </a:solidFill>
+              </a:defRPr>
+            </a:lvl1pPr>
+            <a:lvl2pPr>
+              <a:defRPr sz="900" b="0">
+                <a:solidFill>
+                  <a:srgbClr val="A8B2C1"/>
+                </a:solidFill>
+              </a:defRPr>
+            </a:lvl2pPr>
+            <a:lvl3pPr>
+              <a:defRPr sz="900" b="0">
+                <a:solidFill>
+                  <a:srgbClr val="A8B2C1"/>
+                </a:solidFill>
+              </a:defRPr>
+            </a:lvl3pPr>
+            <a:lvl4pPr>
+              <a:defRPr sz="900" b="0">
+                <a:solidFill>
+                  <a:srgbClr val="A8B2C1"/>
+                </a:solidFill>
+              </a:defRPr>
+            </a:lvl4pPr>
+            <a:lvl5pPr>
+              <a:defRPr sz="900" b="0">
+                <a:solidFill>
+                  <a:srgbClr val="A8B2C1"/>
+                </a:solidFill>
+              </a:defRPr>
+            </a:lvl5pPr>
+          </a:lstStyle>
+          <a:p>
+            <a:endParaRPr lang="en-US"/>
+          </a:p>
+        </p:txBody>
+      </p:sp>
+      <p:sp>
+        <p:nvSpPr>
+          <p:cNvPr id="6" name="Slide Number Placeholder 5"/>
+          <p:cNvSpPr>
+            <a:spLocks noGrp="1"/>
+          </p:cNvSpPr>
+          <p:nvPr>
+            <p:ph type="sldNum" sz="quarter" idx="12"/>
+          </p:nvPr>
+        </p:nvSpPr>
+        <p:spPr/>
+        <p:txBody>
+          <a:bodyPr/>
+          <a:lstStyle>
+            <a:lvl1pPr>
+              <a:defRPr sz="900" b="0">
+                <a:solidFill>
+                  <a:srgbClr val="A8B2C1"/>
+                </a:solidFill>
+              </a:defRPr>
+            </a:lvl1pPr>
+            <a:lvl2pPr>
+              <a:defRPr sz="900" b="0">
+                <a:solidFill>
+                  <a:srgbClr val="A8B2C1"/>
+                </a:solidFill>
+              </a:defRPr>
+            </a:lvl2pPr>
+            <a:lvl3pPr>
+              <a:defRPr sz="900" b="0">
+                <a:solidFill>
+                  <a:srgbClr val="A8B2C1"/>
+                </a:solidFill>
+              </a:defRPr>
+            </a:lvl3pPr>
+            <a:lvl4pPr>
+              <a:defRPr sz="900" b="0">
+                <a:solidFill>
+                  <a:srgbClr val="A8B2C1"/>
+                </a:solidFill>
+              </a:defRPr>
+            </a:lvl4pPr>
+            <a:lvl5pPr>
+              <a:defRPr sz="900" b="0">
+                <a:solidFill>
+                  <a:srgbClr val="A8B2C1"/>
+                </a:solidFill>
+              </a:defRPr>
+            </a:lvl5pPr>
+          </a:lstStyle>
+          <a:p>
+            <a:fld id="{C5EF2332-01BF-834F-8236-50238282D533}" type="slidenum">
+              <a:rPr lang="en-US" smtClean="0"/>
+              <a:t>‹#›</a:t>
+            </a:fld>
+            <a:endParaRPr lang="en-US"/>
+          </a:p>
+        </p:txBody>
       </p:sp>
       <p:sp>
         <p:nvSpPr>
@@ -2918,377 +2926,56 @@
       </p:grpSpPr>
       <p:sp>
         <p:nvSpPr>
-          <p:cNvPr id="2" name="Title 1"/>
-          <p:cNvSpPr>
-            <a:spLocks noGrp="1"/>
-          </p:cNvSpPr>
-          <p:nvPr>
-            <p:ph type="title"/>
-          </p:nvPr>
+          <p:cNvPr id="97" name="NF97"/>
+          <p:cNvSpPr/>
+          <p:nvPr/>
         </p:nvSpPr>
         <p:spPr>
           <a:xfrm>
-            <a:off x="722313" y="3305176"/>
-            <a:ext cx="7772400" cy="1021556"/>
+            <a:off x="90000" y="0"/>
+            <a:ext cx="100000" cy="5143500"/>
           </a:xfrm>
+          <a:prstGeom prst="roundRect">
+            <a:avLst>
+              <a:gd name="adj" fmla="val 5000"/>
+            </a:avLst>
+          </a:prstGeom>
+          <a:noFill/>
+          <a:ln w="12700">
+            <a:solidFill>
+              <a:srgbClr val="FF6B6B"/>
+            </a:solidFill>
+          </a:ln>
+          <a:effectLst>
+            <a:glow rad="62500">
+              <a:srgbClr val="FF6B6B">
+                <a:alpha val="35000"/>
+              </a:srgbClr>
+            </a:glow>
+          </a:effectLst>
         </p:spPr>
-        <p:txBody>
-          <a:bodyPr anchor="t"/>
-          <a:lstStyle>
-            <a:lvl1pPr algn="l">
-              <a:defRPr sz="4000" b="1" cap="all">
-                <a:solidFill>
-                  <a:srgbClr val="FFFFFF"/>
-                </a:solidFill>
-              </a:defRPr>
-            </a:lvl1pPr>
-            <a:lvl2pPr>
-              <a:defRPr sz="4000" b="1">
-                <a:solidFill>
-                  <a:srgbClr val="FFFFFF"/>
-                </a:solidFill>
-              </a:defRPr>
-            </a:lvl2pPr>
-            <a:lvl3pPr>
-              <a:defRPr sz="4000" b="1">
-                <a:solidFill>
-                  <a:srgbClr val="FFFFFF"/>
-                </a:solidFill>
-              </a:defRPr>
-            </a:lvl3pPr>
-            <a:lvl4pPr>
-              <a:defRPr sz="4000" b="1">
-                <a:solidFill>
-                  <a:srgbClr val="FFFFFF"/>
-                </a:solidFill>
-              </a:defRPr>
-            </a:lvl4pPr>
-            <a:lvl5pPr>
-              <a:defRPr sz="4000" b="1">
-                <a:solidFill>
-                  <a:srgbClr val="FFFFFF"/>
-                </a:solidFill>
-              </a:defRPr>
-            </a:lvl5pPr>
-          </a:lstStyle>
-          <a:p>
-            <a:pPr algn="l"/>
-            <a:r>
-              <a:rPr lang="en-US" sz="4000" b="1">
-                <a:solidFill>
-                  <a:srgbClr val="FFFFFF"/>
-                </a:solidFill>
-              </a:rPr>
-              <a:t>Click to edit Master title style</a:t>
-            </a:r>
-          </a:p>
-        </p:txBody>
-      </p:sp>
-      <p:sp>
-        <p:nvSpPr>
-          <p:cNvPr id="3" name="Text Placeholder 2"/>
-          <p:cNvSpPr>
-            <a:spLocks noGrp="1"/>
-          </p:cNvSpPr>
-          <p:nvPr>
-            <p:ph type="body" idx="1"/>
-          </p:nvPr>
+      </p:sp>
+      <p:sp>
+        <p:nvSpPr>
+          <p:cNvPr id="96" name="NF96"/>
+          <p:cNvSpPr/>
+          <p:nvPr/>
         </p:nvSpPr>
         <p:spPr>
           <a:xfrm>
-            <a:off x="722313" y="2180035"/>
-            <a:ext cx="7772400" cy="1125140"/>
+            <a:off x="-45000" y="0"/>
+            <a:ext cx="180000" cy="5143500"/>
           </a:xfrm>
-        </p:spPr>
-        <p:txBody>
-          <a:bodyPr anchor="b"/>
-          <a:lstStyle>
-            <a:lvl1pPr marL="0" indent="0">
-              <a:buNone/>
-              <a:defRPr sz="1800" b="0">
-                <a:solidFill>
-                  <a:srgbClr val="4ECDC4"/>
-                </a:solidFill>
-              </a:defRPr>
-            </a:lvl1pPr>
-            <a:lvl2pPr marL="342900" indent="0">
-              <a:buNone/>
-              <a:defRPr sz="1800" b="0">
-                <a:solidFill>
-                  <a:srgbClr val="4ECDC4"/>
-                </a:solidFill>
-              </a:defRPr>
-            </a:lvl2pPr>
-            <a:lvl3pPr marL="685800" indent="0">
-              <a:buNone/>
-              <a:defRPr sz="1800" b="0">
-                <a:solidFill>
-                  <a:srgbClr val="4ECDC4"/>
-                </a:solidFill>
-              </a:defRPr>
-            </a:lvl3pPr>
-            <a:lvl4pPr marL="1028700" indent="0">
-              <a:buNone/>
-              <a:defRPr sz="1800" b="0">
-                <a:solidFill>
-                  <a:srgbClr val="4ECDC4"/>
-                </a:solidFill>
-              </a:defRPr>
-            </a:lvl4pPr>
-            <a:lvl5pPr marL="1371600" indent="0">
-              <a:buNone/>
-              <a:defRPr sz="1800" b="0">
-                <a:solidFill>
-                  <a:srgbClr val="4ECDC4"/>
-                </a:solidFill>
-              </a:defRPr>
-            </a:lvl5pPr>
-            <a:lvl6pPr marL="1714500" indent="0">
-              <a:buNone/>
-              <a:defRPr sz="1050">
-                <a:solidFill>
-                  <a:schemeClr val="tx1">
-                    <a:tint val="75000"/>
-                  </a:schemeClr>
-                </a:solidFill>
-              </a:defRPr>
-            </a:lvl6pPr>
-            <a:lvl7pPr marL="2057400" indent="0">
-              <a:buNone/>
-              <a:defRPr sz="1050">
-                <a:solidFill>
-                  <a:schemeClr val="tx1">
-                    <a:tint val="75000"/>
-                  </a:schemeClr>
-                </a:solidFill>
-              </a:defRPr>
-            </a:lvl7pPr>
-            <a:lvl8pPr marL="2400300" indent="0">
-              <a:buNone/>
-              <a:defRPr sz="1050">
-                <a:solidFill>
-                  <a:schemeClr val="tx1">
-                    <a:tint val="75000"/>
-                  </a:schemeClr>
-                </a:solidFill>
-              </a:defRPr>
-            </a:lvl8pPr>
-            <a:lvl9pPr marL="2743200" indent="0">
-              <a:buNone/>
-              <a:defRPr sz="1050">
-                <a:solidFill>
-                  <a:schemeClr val="tx1">
-                    <a:tint val="75000"/>
-                  </a:schemeClr>
-                </a:solidFill>
-              </a:defRPr>
-            </a:lvl9pPr>
-          </a:lstStyle>
-          <a:p>
-            <a:pPr lvl="0" algn="l"/>
-            <a:r>
-              <a:rPr lang="en-US" sz="1800" b="0">
-                <a:solidFill>
-                  <a:srgbClr val="4ECDC4"/>
-                </a:solidFill>
-              </a:rPr>
-              <a:t>Click to edit Master text styles</a:t>
-            </a:r>
-          </a:p>
-        </p:txBody>
-      </p:sp>
-      <p:sp>
-        <p:nvSpPr>
-          <p:cNvPr id="4" name="Date Placeholder 3"/>
-          <p:cNvSpPr>
-            <a:spLocks noGrp="1"/>
-          </p:cNvSpPr>
-          <p:nvPr>
-            <p:ph type="dt" sz="half" idx="10"/>
-          </p:nvPr>
-        </p:nvSpPr>
-        <p:spPr/>
-        <p:txBody>
-          <a:bodyPr/>
-          <a:lstStyle>
-            <a:lvl1pPr>
-              <a:defRPr sz="900" b="0">
-                <a:solidFill>
-                  <a:srgbClr val="A8B2C1"/>
-                </a:solidFill>
-              </a:defRPr>
-            </a:lvl1pPr>
-            <a:lvl2pPr>
-              <a:defRPr sz="900" b="0">
-                <a:solidFill>
-                  <a:srgbClr val="A8B2C1"/>
-                </a:solidFill>
-              </a:defRPr>
-            </a:lvl2pPr>
-            <a:lvl3pPr>
-              <a:defRPr sz="900" b="0">
-                <a:solidFill>
-                  <a:srgbClr val="A8B2C1"/>
-                </a:solidFill>
-              </a:defRPr>
-            </a:lvl3pPr>
-            <a:lvl4pPr>
-              <a:defRPr sz="900" b="0">
-                <a:solidFill>
-                  <a:srgbClr val="A8B2C1"/>
-                </a:solidFill>
-              </a:defRPr>
-            </a:lvl4pPr>
-            <a:lvl5pPr>
-              <a:defRPr sz="900" b="0">
-                <a:solidFill>
-                  <a:srgbClr val="A8B2C1"/>
-                </a:solidFill>
-              </a:defRPr>
-            </a:lvl5pPr>
-          </a:lstStyle>
-          <a:p>
-            <a:fld id="{241EB5C9-1307-BA42-ABA2-0BC069CD8E7F}" type="datetimeFigureOut">
-              <a:rPr lang="en-US" smtClean="0"/>
-              <a:t>1/2/22</a:t>
-            </a:fld>
-            <a:endParaRPr lang="en-US"/>
-          </a:p>
-        </p:txBody>
-      </p:sp>
-      <p:sp>
-        <p:nvSpPr>
-          <p:cNvPr id="5" name="Footer Placeholder 4"/>
-          <p:cNvSpPr>
-            <a:spLocks noGrp="1"/>
-          </p:cNvSpPr>
-          <p:nvPr>
-            <p:ph type="ftr" sz="quarter" idx="11"/>
-          </p:nvPr>
-        </p:nvSpPr>
-        <p:spPr/>
-        <p:txBody>
-          <a:bodyPr/>
-          <a:lstStyle>
-            <a:lvl1pPr>
-              <a:defRPr sz="900" b="0">
-                <a:solidFill>
-                  <a:srgbClr val="A8B2C1"/>
-                </a:solidFill>
-              </a:defRPr>
-            </a:lvl1pPr>
-            <a:lvl2pPr>
-              <a:defRPr sz="900" b="0">
-                <a:solidFill>
-                  <a:srgbClr val="A8B2C1"/>
-                </a:solidFill>
-              </a:defRPr>
-            </a:lvl2pPr>
-            <a:lvl3pPr>
-              <a:defRPr sz="900" b="0">
-                <a:solidFill>
-                  <a:srgbClr val="A8B2C1"/>
-                </a:solidFill>
-              </a:defRPr>
-            </a:lvl3pPr>
-            <a:lvl4pPr>
-              <a:defRPr sz="900" b="0">
-                <a:solidFill>
-                  <a:srgbClr val="A8B2C1"/>
-                </a:solidFill>
-              </a:defRPr>
-            </a:lvl4pPr>
-            <a:lvl5pPr>
-              <a:defRPr sz="900" b="0">
-                <a:solidFill>
-                  <a:srgbClr val="A8B2C1"/>
-                </a:solidFill>
-              </a:defRPr>
-            </a:lvl5pPr>
-          </a:lstStyle>
-          <a:p>
-            <a:endParaRPr lang="en-US"/>
-          </a:p>
-        </p:txBody>
-      </p:sp>
-      <p:sp>
-        <p:nvSpPr>
-          <p:cNvPr id="6" name="Slide Number Placeholder 5"/>
-          <p:cNvSpPr>
-            <a:spLocks noGrp="1"/>
-          </p:cNvSpPr>
-          <p:nvPr>
-            <p:ph type="sldNum" sz="quarter" idx="12"/>
-          </p:nvPr>
-        </p:nvSpPr>
-        <p:spPr/>
-        <p:txBody>
-          <a:bodyPr/>
-          <a:lstStyle>
-            <a:lvl1pPr>
-              <a:defRPr sz="900" b="0">
-                <a:solidFill>
-                  <a:srgbClr val="A8B2C1"/>
-                </a:solidFill>
-              </a:defRPr>
-            </a:lvl1pPr>
-            <a:lvl2pPr>
-              <a:defRPr sz="900" b="0">
-                <a:solidFill>
-                  <a:srgbClr val="A8B2C1"/>
-                </a:solidFill>
-              </a:defRPr>
-            </a:lvl2pPr>
-            <a:lvl3pPr>
-              <a:defRPr sz="900" b="0">
-                <a:solidFill>
-                  <a:srgbClr val="A8B2C1"/>
-                </a:solidFill>
-              </a:defRPr>
-            </a:lvl3pPr>
-            <a:lvl4pPr>
-              <a:defRPr sz="900" b="0">
-                <a:solidFill>
-                  <a:srgbClr val="A8B2C1"/>
-                </a:solidFill>
-              </a:defRPr>
-            </a:lvl4pPr>
-            <a:lvl5pPr>
-              <a:defRPr sz="900" b="0">
-                <a:solidFill>
-                  <a:srgbClr val="A8B2C1"/>
-                </a:solidFill>
-              </a:defRPr>
-            </a:lvl5pPr>
-          </a:lstStyle>
-          <a:p>
-            <a:fld id="{C5EF2332-01BF-834F-8236-50238282D533}" type="slidenum">
-              <a:rPr lang="en-US" smtClean="0"/>
-              <a:t>‹#›</a:t>
-            </a:fld>
-            <a:endParaRPr lang="en-US"/>
-          </a:p>
-        </p:txBody>
-      </p:sp>
-      <p:sp>
-        <p:nvSpPr>
-          <p:cNvPr id="96" name="R96"/>
-          <p:cNvSpPr/>
-          <p:nvPr/>
-        </p:nvSpPr>
-        <p:spPr>
-          <a:xfrm>
-            <a:off x="0" y="0"/>
-            <a:ext cx="90000" cy="5143500"/>
-          </a:xfrm>
-          <a:prstGeom prst="rect">
-            <a:avLst/>
+          <a:prstGeom prst="roundRect">
+            <a:avLst>
+              <a:gd name="adj" fmla="val 5000"/>
+            </a:avLst>
           </a:prstGeom>
-          <a:solidFill>
-            <a:srgbClr val="E8A838"/>
-          </a:solidFill>
-          <a:ln>
-            <a:noFill/>
+          <a:noFill/>
+          <a:ln w="19050">
+            <a:solidFill>
+              <a:srgbClr val="E8A838"/>
+            </a:solidFill>
           </a:ln>
           <a:effectLst>
             <a:glow rad="80000">
@@ -3301,32 +2988,357 @@
       </p:sp>
       <p:sp>
         <p:nvSpPr>
-          <p:cNvPr id="97" name="R97"/>
-          <p:cNvSpPr/>
-          <p:nvPr/>
+          <p:cNvPr id="2" name="Title 1"/>
+          <p:cNvSpPr>
+            <a:spLocks noGrp="1"/>
+          </p:cNvSpPr>
+          <p:nvPr>
+            <p:ph type="title"/>
+          </p:nvPr>
         </p:nvSpPr>
         <p:spPr>
           <a:xfrm>
-            <a:off x="110000" y="0"/>
-            <a:ext cx="40000" cy="5143500"/>
+            <a:off x="722313" y="3305176"/>
+            <a:ext cx="7772400" cy="1021556"/>
           </a:xfrm>
-          <a:prstGeom prst="rect">
-            <a:avLst/>
-          </a:prstGeom>
-          <a:solidFill>
-            <a:srgbClr val="FF6B6B"/>
-          </a:solidFill>
-          <a:ln>
-            <a:noFill/>
-          </a:ln>
-          <a:effectLst>
-            <a:glow rad="62500">
-              <a:srgbClr val="FF6B6B">
-                <a:alpha val="35000"/>
-              </a:srgbClr>
-            </a:glow>
-          </a:effectLst>
         </p:spPr>
+        <p:txBody>
+          <a:bodyPr anchor="t"/>
+          <a:lstStyle>
+            <a:lvl1pPr algn="l">
+              <a:defRPr sz="4000" b="1" cap="all">
+                <a:solidFill>
+                  <a:srgbClr val="FFFFFF"/>
+                </a:solidFill>
+              </a:defRPr>
+            </a:lvl1pPr>
+            <a:lvl2pPr>
+              <a:defRPr sz="4000" b="1">
+                <a:solidFill>
+                  <a:srgbClr val="FFFFFF"/>
+                </a:solidFill>
+              </a:defRPr>
+            </a:lvl2pPr>
+            <a:lvl3pPr>
+              <a:defRPr sz="4000" b="1">
+                <a:solidFill>
+                  <a:srgbClr val="FFFFFF"/>
+                </a:solidFill>
+              </a:defRPr>
+            </a:lvl3pPr>
+            <a:lvl4pPr>
+              <a:defRPr sz="4000" b="1">
+                <a:solidFill>
+                  <a:srgbClr val="FFFFFF"/>
+                </a:solidFill>
+              </a:defRPr>
+            </a:lvl4pPr>
+            <a:lvl5pPr>
+              <a:defRPr sz="4000" b="1">
+                <a:solidFill>
+                  <a:srgbClr val="FFFFFF"/>
+                </a:solidFill>
+              </a:defRPr>
+            </a:lvl5pPr>
+          </a:lstStyle>
+          <a:p>
+            <a:pPr algn="l"/>
+            <a:r>
+              <a:rPr lang="en-US" sz="4000" b="1">
+                <a:solidFill>
+                  <a:srgbClr val="FFFFFF"/>
+                </a:solidFill>
+              </a:rPr>
+              <a:t>Click to edit Master title style</a:t>
+            </a:r>
+          </a:p>
+        </p:txBody>
+      </p:sp>
+      <p:sp>
+        <p:nvSpPr>
+          <p:cNvPr id="3" name="Text Placeholder 2"/>
+          <p:cNvSpPr>
+            <a:spLocks noGrp="1"/>
+          </p:cNvSpPr>
+          <p:nvPr>
+            <p:ph type="body" idx="1"/>
+          </p:nvPr>
+        </p:nvSpPr>
+        <p:spPr>
+          <a:xfrm>
+            <a:off x="722313" y="2180035"/>
+            <a:ext cx="7772400" cy="1125140"/>
+          </a:xfrm>
+        </p:spPr>
+        <p:txBody>
+          <a:bodyPr anchor="b"/>
+          <a:lstStyle>
+            <a:lvl1pPr marL="0" indent="0">
+              <a:buNone/>
+              <a:defRPr sz="1800" b="0">
+                <a:solidFill>
+                  <a:srgbClr val="4ECDC4"/>
+                </a:solidFill>
+              </a:defRPr>
+            </a:lvl1pPr>
+            <a:lvl2pPr marL="342900" indent="0">
+              <a:buNone/>
+              <a:defRPr sz="1800" b="0">
+                <a:solidFill>
+                  <a:srgbClr val="4ECDC4"/>
+                </a:solidFill>
+              </a:defRPr>
+            </a:lvl2pPr>
+            <a:lvl3pPr marL="685800" indent="0">
+              <a:buNone/>
+              <a:defRPr sz="1800" b="0">
+                <a:solidFill>
+                  <a:srgbClr val="4ECDC4"/>
+                </a:solidFill>
+              </a:defRPr>
+            </a:lvl3pPr>
+            <a:lvl4pPr marL="1028700" indent="0">
+              <a:buNone/>
+              <a:defRPr sz="1800" b="0">
+                <a:solidFill>
+                  <a:srgbClr val="4ECDC4"/>
+                </a:solidFill>
+              </a:defRPr>
+            </a:lvl4pPr>
+            <a:lvl5pPr marL="1371600" indent="0">
+              <a:buNone/>
+              <a:defRPr sz="1800" b="0">
+                <a:solidFill>
+                  <a:srgbClr val="4ECDC4"/>
+                </a:solidFill>
+              </a:defRPr>
+            </a:lvl5pPr>
+            <a:lvl6pPr marL="1714500" indent="0">
+              <a:buNone/>
+              <a:defRPr sz="1050">
+                <a:solidFill>
+                  <a:schemeClr val="tx1">
+                    <a:tint val="75000"/>
+                  </a:schemeClr>
+                </a:solidFill>
+              </a:defRPr>
+            </a:lvl6pPr>
+            <a:lvl7pPr marL="2057400" indent="0">
+              <a:buNone/>
+              <a:defRPr sz="1050">
+                <a:solidFill>
+                  <a:schemeClr val="tx1">
+                    <a:tint val="75000"/>
+                  </a:schemeClr>
+                </a:solidFill>
+              </a:defRPr>
+            </a:lvl7pPr>
+            <a:lvl8pPr marL="2400300" indent="0">
+              <a:buNone/>
+              <a:defRPr sz="1050">
+                <a:solidFill>
+                  <a:schemeClr val="tx1">
+                    <a:tint val="75000"/>
+                  </a:schemeClr>
+                </a:solidFill>
+              </a:defRPr>
+            </a:lvl8pPr>
+            <a:lvl9pPr marL="2743200" indent="0">
+              <a:buNone/>
+              <a:defRPr sz="1050">
+                <a:solidFill>
+                  <a:schemeClr val="tx1">
+                    <a:tint val="75000"/>
+                  </a:schemeClr>
+                </a:solidFill>
+              </a:defRPr>
+            </a:lvl9pPr>
+          </a:lstStyle>
+          <a:p>
+            <a:pPr lvl="0" algn="l"/>
+            <a:r>
+              <a:rPr lang="en-US" sz="1800" b="0">
+                <a:solidFill>
+                  <a:srgbClr val="4ECDC4"/>
+                </a:solidFill>
+              </a:rPr>
+              <a:t>Click to edit Master text styles</a:t>
+            </a:r>
+          </a:p>
+        </p:txBody>
+      </p:sp>
+      <p:sp>
+        <p:nvSpPr>
+          <p:cNvPr id="4" name="Date Placeholder 3"/>
+          <p:cNvSpPr>
+            <a:spLocks noGrp="1"/>
+          </p:cNvSpPr>
+          <p:nvPr>
+            <p:ph type="dt" sz="half" idx="10"/>
+          </p:nvPr>
+        </p:nvSpPr>
+        <p:spPr/>
+        <p:txBody>
+          <a:bodyPr/>
+          <a:lstStyle>
+            <a:lvl1pPr>
+              <a:defRPr sz="900" b="0">
+                <a:solidFill>
+                  <a:srgbClr val="A8B2C1"/>
+                </a:solidFill>
+              </a:defRPr>
+            </a:lvl1pPr>
+            <a:lvl2pPr>
+              <a:defRPr sz="900" b="0">
+                <a:solidFill>
+                  <a:srgbClr val="A8B2C1"/>
+                </a:solidFill>
+              </a:defRPr>
+            </a:lvl2pPr>
+            <a:lvl3pPr>
+              <a:defRPr sz="900" b="0">
+                <a:solidFill>
+                  <a:srgbClr val="A8B2C1"/>
+                </a:solidFill>
+              </a:defRPr>
+            </a:lvl3pPr>
+            <a:lvl4pPr>
+              <a:defRPr sz="900" b="0">
+                <a:solidFill>
+                  <a:srgbClr val="A8B2C1"/>
+                </a:solidFill>
+              </a:defRPr>
+            </a:lvl4pPr>
+            <a:lvl5pPr>
+              <a:defRPr sz="900" b="0">
+                <a:solidFill>
+                  <a:srgbClr val="A8B2C1"/>
+                </a:solidFill>
+              </a:defRPr>
+            </a:lvl5pPr>
+          </a:lstStyle>
+          <a:p>
+            <a:fld id="{241EB5C9-1307-BA42-ABA2-0BC069CD8E7F}" type="datetimeFigureOut">
+              <a:rPr lang="en-US" smtClean="0"/>
+              <a:t>1/2/22</a:t>
+            </a:fld>
+            <a:endParaRPr lang="en-US"/>
+          </a:p>
+        </p:txBody>
+      </p:sp>
+      <p:sp>
+        <p:nvSpPr>
+          <p:cNvPr id="5" name="Footer Placeholder 4"/>
+          <p:cNvSpPr>
+            <a:spLocks noGrp="1"/>
+          </p:cNvSpPr>
+          <p:nvPr>
+            <p:ph type="ftr" sz="quarter" idx="11"/>
+          </p:nvPr>
+        </p:nvSpPr>
+        <p:spPr/>
+        <p:txBody>
+          <a:bodyPr/>
+          <a:lstStyle>
+            <a:lvl1pPr>
+              <a:defRPr sz="900" b="0">
+                <a:solidFill>
+                  <a:srgbClr val="A8B2C1"/>
+                </a:solidFill>
+              </a:defRPr>
+            </a:lvl1pPr>
+            <a:lvl2pPr>
+              <a:defRPr sz="900" b="0">
+                <a:solidFill>
+                  <a:srgbClr val="A8B2C1"/>
+                </a:solidFill>
+              </a:defRPr>
+            </a:lvl2pPr>
+            <a:lvl3pPr>
+              <a:defRPr sz="900" b="0">
+                <a:solidFill>
+                  <a:srgbClr val="A8B2C1"/>
+                </a:solidFill>
+              </a:defRPr>
+            </a:lvl3pPr>
+            <a:lvl4pPr>
+              <a:defRPr sz="900" b="0">
+                <a:solidFill>
+                  <a:srgbClr val="A8B2C1"/>
+                </a:solidFill>
+              </a:defRPr>
+            </a:lvl4pPr>
+            <a:lvl5pPr>
+              <a:defRPr sz="900" b="0">
+                <a:solidFill>
+                  <a:srgbClr val="A8B2C1"/>
+                </a:solidFill>
+              </a:defRPr>
+            </a:lvl5pPr>
+          </a:lstStyle>
+          <a:p>
+            <a:endParaRPr lang="en-US"/>
+          </a:p>
+        </p:txBody>
+      </p:sp>
+      <p:sp>
+        <p:nvSpPr>
+          <p:cNvPr id="6" name="Slide Number Placeholder 5"/>
+          <p:cNvSpPr>
+            <a:spLocks noGrp="1"/>
+          </p:cNvSpPr>
+          <p:nvPr>
+            <p:ph type="sldNum" sz="quarter" idx="12"/>
+          </p:nvPr>
+        </p:nvSpPr>
+        <p:spPr/>
+        <p:txBody>
+          <a:bodyPr/>
+          <a:lstStyle>
+            <a:lvl1pPr>
+              <a:defRPr sz="900" b="0">
+                <a:solidFill>
+                  <a:srgbClr val="A8B2C1"/>
+                </a:solidFill>
+              </a:defRPr>
+            </a:lvl1pPr>
+            <a:lvl2pPr>
+              <a:defRPr sz="900" b="0">
+                <a:solidFill>
+                  <a:srgbClr val="A8B2C1"/>
+                </a:solidFill>
+              </a:defRPr>
+            </a:lvl2pPr>
+            <a:lvl3pPr>
+              <a:defRPr sz="900" b="0">
+                <a:solidFill>
+                  <a:srgbClr val="A8B2C1"/>
+                </a:solidFill>
+              </a:defRPr>
+            </a:lvl3pPr>
+            <a:lvl4pPr>
+              <a:defRPr sz="900" b="0">
+                <a:solidFill>
+                  <a:srgbClr val="A8B2C1"/>
+                </a:solidFill>
+              </a:defRPr>
+            </a:lvl4pPr>
+            <a:lvl5pPr>
+              <a:defRPr sz="900" b="0">
+                <a:solidFill>
+                  <a:srgbClr val="A8B2C1"/>
+                </a:solidFill>
+              </a:defRPr>
+            </a:lvl5pPr>
+          </a:lstStyle>
+          <a:p>
+            <a:fld id="{C5EF2332-01BF-834F-8236-50238282D533}" type="slidenum">
+              <a:rPr lang="en-US" smtClean="0"/>
+              <a:t>‹#›</a:t>
+            </a:fld>
+            <a:endParaRPr lang="en-US"/>
+          </a:p>
+        </p:txBody>
       </p:sp>
     </p:spTree>
     <p:extLst>

</xml_diff>